<commit_message>
More Apache Zeppelin Notebook updated
</commit_message>
<xml_diff>
--- a/Apache Zeppelin_v3.pptx
+++ b/Apache Zeppelin_v3.pptx
@@ -16,8 +16,8 @@
     <p:sldId id="260" r:id="rId4"/>
     <p:sldId id="259" r:id="rId5"/>
     <p:sldId id="258" r:id="rId6"/>
-    <p:sldId id="262" r:id="rId7"/>
-    <p:sldId id="263" r:id="rId8"/>
+    <p:sldId id="263" r:id="rId7"/>
+    <p:sldId id="266" r:id="rId8"/>
     <p:sldId id="264" r:id="rId9"/>
     <p:sldId id="265" r:id="rId10"/>
   </p:sldIdLst>
@@ -6145,19 +6145,22 @@
         </p:nvSpPr>
         <p:spPr/>
         <p:txBody>
-          <a:bodyPr>
-            <a:normAutofit/>
-          </a:bodyPr>
+          <a:bodyPr/>
           <a:lstStyle/>
           <a:p>
             <a:r>
               <a:rPr lang="en-US" b="1" dirty="0"/>
-              <a:t>Zeppelin: </a:t>
-            </a:r>
-            <a:br>
+              <a:t>Zeppelin Over </a:t>
+            </a:r>
+            <a:r>
+              <a:rPr lang="en-US" b="1" dirty="0" err="1"/>
+              <a:t>Jupyter</a:t>
+            </a:r>
+            <a:r>
               <a:rPr lang="en-US" b="1" dirty="0"/>
-            </a:br>
-            <a:endParaRPr lang="en-US" b="1" dirty="0"/>
+              <a:t> </a:t>
+            </a:r>
+            <a:endParaRPr lang="en-US" dirty="0"/>
           </a:p>
         </p:txBody>
       </p:sp>
@@ -6166,7 +6169,7 @@
           <p:cNvPr id="4" name="Picture 6" descr="Image result for apache zeppelin logo">
             <a:extLst>
               <a:ext uri="{FF2B5EF4-FFF2-40B4-BE49-F238E27FC236}">
-                <a16:creationId xmlns:a16="http://schemas.microsoft.com/office/drawing/2014/main" id="{491C12A7-0BA0-4D03-B715-09B190D66143}"/>
+                <a16:creationId xmlns:a16="http://schemas.microsoft.com/office/drawing/2014/main" id="{D389AD30-2EEB-419A-9439-32017F66A537}"/>
               </a:ext>
             </a:extLst>
           </p:cNvPr>
@@ -6176,7 +6179,7 @@
           <p:nvPr/>
         </p:nvPicPr>
         <p:blipFill>
-          <a:blip r:embed="rId3">
+          <a:blip r:embed="rId2">
             <a:extLst>
               <a:ext uri="{28A0092B-C50C-407E-A947-70E740481C1C}">
                 <a14:useLocalDpi xmlns:a14="http://schemas.microsoft.com/office/drawing/2010/main" val="0"/>
@@ -6213,7 +6216,7 @@
           <p:cNvPr id="5" name="Slide Number Placeholder 4">
             <a:extLst>
               <a:ext uri="{FF2B5EF4-FFF2-40B4-BE49-F238E27FC236}">
-                <a16:creationId xmlns:a16="http://schemas.microsoft.com/office/drawing/2014/main" id="{42CE6D2B-E636-42BA-A4FB-99B323D69B3C}"/>
+                <a16:creationId xmlns:a16="http://schemas.microsoft.com/office/drawing/2014/main" id="{ABF00AA4-D62D-4CDF-8106-6DD698D5687F}"/>
               </a:ext>
             </a:extLst>
           </p:cNvPr>
@@ -6245,366 +6248,496 @@
           </a:p>
         </p:txBody>
       </p:sp>
-      <p:pic>
-        <p:nvPicPr>
-          <p:cNvPr id="1026" name="Picture 2">
-            <a:extLst>
-              <a:ext uri="{FF2B5EF4-FFF2-40B4-BE49-F238E27FC236}">
-                <a16:creationId xmlns:a16="http://schemas.microsoft.com/office/drawing/2014/main" id="{669F5283-0DC0-4D4C-9044-4CF720798278}"/>
-              </a:ext>
-            </a:extLst>
-          </p:cNvPr>
-          <p:cNvPicPr>
-            <a:picLocks noGrp="1" noChangeAspect="1" noChangeArrowheads="1"/>
-          </p:cNvPicPr>
+      <p:sp>
+        <p:nvSpPr>
+          <p:cNvPr id="9" name="Google Shape;150;g7215718d5a_0_18">
+            <a:extLst>
+              <a:ext uri="{FF2B5EF4-FFF2-40B4-BE49-F238E27FC236}">
+                <a16:creationId xmlns:a16="http://schemas.microsoft.com/office/drawing/2014/main" id="{CBB9B068-A6CC-4653-96FB-7FFBDDC73711}"/>
+              </a:ext>
+            </a:extLst>
+          </p:cNvPr>
+          <p:cNvSpPr>
+            <a:spLocks noGrp="1"/>
+          </p:cNvSpPr>
           <p:nvPr>
             <p:ph idx="1"/>
           </p:nvPr>
-        </p:nvPicPr>
-        <p:blipFill>
-          <a:blip r:embed="rId4">
-            <a:extLst>
-              <a:ext uri="{28A0092B-C50C-407E-A947-70E740481C1C}">
-                <a14:useLocalDpi xmlns:a14="http://schemas.microsoft.com/office/drawing/2010/main" val="0"/>
-              </a:ext>
-            </a:extLst>
-          </a:blip>
-          <a:srcRect/>
-          <a:stretch>
-            <a:fillRect/>
-          </a:stretch>
-        </p:blipFill>
-        <p:spPr bwMode="auto">
+        </p:nvSpPr>
+        <p:spPr>
           <a:xfrm>
-            <a:off x="5176109" y="215856"/>
-            <a:ext cx="4937651" cy="2807754"/>
+            <a:off x="838200" y="1825625"/>
+            <a:ext cx="10515600" cy="4351338"/>
           </a:xfrm>
           <a:prstGeom prst="rect">
             <a:avLst/>
           </a:prstGeom>
+          <a:noFill/>
           <a:ln>
             <a:noFill/>
           </a:ln>
-          <a:effectLst>
-            <a:softEdge rad="112500"/>
-          </a:effectLst>
-          <a:extLst>
-            <a:ext uri="{909E8E84-426E-40DD-AFC4-6F175D3DCCD1}">
-              <a14:hiddenFill xmlns:a14="http://schemas.microsoft.com/office/drawing/2010/main">
-                <a:solidFill>
-                  <a:srgbClr val="FFFFFF"/>
-                </a:solidFill>
-              </a14:hiddenFill>
-            </a:ext>
-          </a:extLst>
         </p:spPr>
-      </p:pic>
-      <p:sp>
-        <p:nvSpPr>
-          <p:cNvPr id="6" name="Rectangle 5">
-            <a:extLst>
-              <a:ext uri="{FF2B5EF4-FFF2-40B4-BE49-F238E27FC236}">
-                <a16:creationId xmlns:a16="http://schemas.microsoft.com/office/drawing/2014/main" id="{0A7B19F4-C9FB-4C32-B03F-6F42CCFA3C63}"/>
-              </a:ext>
-            </a:extLst>
-          </p:cNvPr>
-          <p:cNvSpPr/>
-          <p:nvPr/>
-        </p:nvSpPr>
-        <p:spPr>
-          <a:xfrm>
-            <a:off x="445481" y="1388901"/>
-            <a:ext cx="3869067" cy="830997"/>
-          </a:xfrm>
-          <a:prstGeom prst="rect">
-            <a:avLst/>
-          </a:prstGeom>
-        </p:spPr>
-        <p:txBody>
-          <a:bodyPr wrap="square">
-            <a:spAutoFit/>
+        <p:txBody>
+          <a:bodyPr spcFirstLastPara="1" wrap="square" lIns="91425" tIns="45700" rIns="91425" bIns="45700" anchor="t" anchorCtr="0">
+            <a:noAutofit/>
           </a:bodyPr>
           <a:lstStyle/>
           <a:p>
-            <a:r>
-              <a:rPr lang="en-US" sz="2400" b="1" dirty="0"/>
-              <a:t>Easy and safe way to make data interactive together</a:t>
-            </a:r>
-            <a:endParaRPr lang="en-US" sz="2400" dirty="0"/>
+            <a:pPr marL="457200" marR="0" lvl="0" indent="-381000" algn="l" rtl="0">
+              <a:spcBef>
+                <a:spcPts val="0"/>
+              </a:spcBef>
+              <a:spcAft>
+                <a:spcPts val="0"/>
+              </a:spcAft>
+              <a:buClr>
+                <a:schemeClr val="dk1"/>
+              </a:buClr>
+              <a:buSzPts val="2400"/>
+              <a:buFont typeface="Calibri"/>
+              <a:buChar char="●"/>
+            </a:pPr>
+            <a:r>
+              <a:rPr lang="en-US" sz="2400" dirty="0">
+                <a:solidFill>
+                  <a:schemeClr val="dk1"/>
+                </a:solidFill>
+                <a:latin typeface="Calibri"/>
+                <a:ea typeface="Calibri"/>
+                <a:cs typeface="Calibri"/>
+                <a:sym typeface="Calibri"/>
+              </a:rPr>
+              <a:t>Secure Collaborations</a:t>
+            </a:r>
+            <a:endParaRPr sz="2400" dirty="0">
+              <a:solidFill>
+                <a:schemeClr val="dk1"/>
+              </a:solidFill>
+              <a:latin typeface="Calibri"/>
+              <a:ea typeface="Calibri"/>
+              <a:cs typeface="Calibri"/>
+              <a:sym typeface="Calibri"/>
+            </a:endParaRPr>
+          </a:p>
+          <a:p>
+            <a:pPr marL="914400" marR="0" lvl="1" indent="-381000" algn="l" rtl="0">
+              <a:spcBef>
+                <a:spcPts val="0"/>
+              </a:spcBef>
+              <a:spcAft>
+                <a:spcPts val="0"/>
+              </a:spcAft>
+              <a:buClr>
+                <a:schemeClr val="dk1"/>
+              </a:buClr>
+              <a:buSzPts val="2400"/>
+              <a:buFont typeface="Calibri"/>
+              <a:buChar char="○"/>
+            </a:pPr>
+            <a:r>
+              <a:rPr lang="en-US" sz="2400" dirty="0">
+                <a:solidFill>
+                  <a:schemeClr val="dk1"/>
+                </a:solidFill>
+                <a:latin typeface="Calibri"/>
+                <a:ea typeface="Calibri"/>
+                <a:cs typeface="Calibri"/>
+                <a:sym typeface="Calibri"/>
+              </a:rPr>
+              <a:t>Security measures</a:t>
+            </a:r>
+            <a:endParaRPr sz="2400" dirty="0">
+              <a:solidFill>
+                <a:schemeClr val="dk1"/>
+              </a:solidFill>
+              <a:latin typeface="Calibri"/>
+              <a:ea typeface="Calibri"/>
+              <a:cs typeface="Calibri"/>
+              <a:sym typeface="Calibri"/>
+            </a:endParaRPr>
+          </a:p>
+          <a:p>
+            <a:pPr marL="914400" marR="0" lvl="1" indent="-381000" algn="l" rtl="0">
+              <a:spcBef>
+                <a:spcPts val="0"/>
+              </a:spcBef>
+              <a:spcAft>
+                <a:spcPts val="0"/>
+              </a:spcAft>
+              <a:buClr>
+                <a:schemeClr val="dk1"/>
+              </a:buClr>
+              <a:buSzPts val="2400"/>
+              <a:buFont typeface="Calibri"/>
+              <a:buChar char="○"/>
+            </a:pPr>
+            <a:r>
+              <a:rPr lang="en-US" sz="2400" dirty="0">
+                <a:solidFill>
+                  <a:schemeClr val="dk1"/>
+                </a:solidFill>
+                <a:latin typeface="Calibri"/>
+                <a:ea typeface="Calibri"/>
+                <a:cs typeface="Calibri"/>
+                <a:sym typeface="Calibri"/>
+              </a:rPr>
+              <a:t>Real time changes</a:t>
+            </a:r>
+            <a:endParaRPr sz="2400" dirty="0">
+              <a:solidFill>
+                <a:schemeClr val="dk1"/>
+              </a:solidFill>
+              <a:latin typeface="Calibri"/>
+              <a:ea typeface="Calibri"/>
+              <a:cs typeface="Calibri"/>
+              <a:sym typeface="Calibri"/>
+            </a:endParaRPr>
+          </a:p>
+          <a:p>
+            <a:pPr marL="914400" marR="0" lvl="1" indent="-381000" algn="l" rtl="0">
+              <a:spcBef>
+                <a:spcPts val="0"/>
+              </a:spcBef>
+              <a:spcAft>
+                <a:spcPts val="0"/>
+              </a:spcAft>
+              <a:buClr>
+                <a:schemeClr val="dk1"/>
+              </a:buClr>
+              <a:buSzPts val="2400"/>
+              <a:buFont typeface="Calibri"/>
+              <a:buChar char="○"/>
+            </a:pPr>
+            <a:r>
+              <a:rPr lang="en-US" sz="2400" dirty="0">
+                <a:solidFill>
+                  <a:schemeClr val="dk1"/>
+                </a:solidFill>
+                <a:latin typeface="Calibri"/>
+                <a:ea typeface="Calibri"/>
+                <a:cs typeface="Calibri"/>
+                <a:sym typeface="Calibri"/>
+              </a:rPr>
+              <a:t>Sharing  - read only, read and edit</a:t>
+            </a:r>
+            <a:endParaRPr sz="2400" dirty="0">
+              <a:solidFill>
+                <a:schemeClr val="dk1"/>
+              </a:solidFill>
+              <a:latin typeface="Calibri"/>
+              <a:ea typeface="Calibri"/>
+              <a:cs typeface="Calibri"/>
+              <a:sym typeface="Calibri"/>
+            </a:endParaRPr>
+          </a:p>
+          <a:p>
+            <a:pPr marL="914400" marR="0" lvl="1" indent="-381000" algn="l" rtl="0">
+              <a:spcBef>
+                <a:spcPts val="0"/>
+              </a:spcBef>
+              <a:spcAft>
+                <a:spcPts val="0"/>
+              </a:spcAft>
+              <a:buClr>
+                <a:schemeClr val="dk1"/>
+              </a:buClr>
+              <a:buSzPts val="2400"/>
+              <a:buFont typeface="Calibri"/>
+              <a:buChar char="○"/>
+            </a:pPr>
+            <a:r>
+              <a:rPr lang="en-US" sz="2400" dirty="0">
+                <a:solidFill>
+                  <a:schemeClr val="dk1"/>
+                </a:solidFill>
+                <a:latin typeface="Calibri"/>
+                <a:ea typeface="Calibri"/>
+                <a:cs typeface="Calibri"/>
+                <a:sym typeface="Calibri"/>
+              </a:rPr>
+              <a:t>Embedding link</a:t>
+            </a:r>
+            <a:endParaRPr sz="2400" dirty="0">
+              <a:solidFill>
+                <a:schemeClr val="dk1"/>
+              </a:solidFill>
+              <a:latin typeface="Calibri"/>
+              <a:ea typeface="Calibri"/>
+              <a:cs typeface="Calibri"/>
+              <a:sym typeface="Calibri"/>
+            </a:endParaRPr>
+          </a:p>
+          <a:p>
+            <a:pPr marL="457200" marR="0" lvl="0" indent="-381000" algn="l" rtl="0">
+              <a:spcBef>
+                <a:spcPts val="0"/>
+              </a:spcBef>
+              <a:spcAft>
+                <a:spcPts val="0"/>
+              </a:spcAft>
+              <a:buClr>
+                <a:schemeClr val="dk1"/>
+              </a:buClr>
+              <a:buSzPts val="2400"/>
+              <a:buFont typeface="Calibri"/>
+              <a:buChar char="●"/>
+            </a:pPr>
+            <a:r>
+              <a:rPr lang="en-US" sz="2400" dirty="0">
+                <a:solidFill>
+                  <a:schemeClr val="dk1"/>
+                </a:solidFill>
+                <a:latin typeface="Calibri"/>
+                <a:ea typeface="Calibri"/>
+                <a:cs typeface="Calibri"/>
+                <a:sym typeface="Calibri"/>
+              </a:rPr>
+              <a:t>Extensive Graphing Capabilities </a:t>
+            </a:r>
+            <a:endParaRPr sz="2400" dirty="0">
+              <a:solidFill>
+                <a:schemeClr val="dk1"/>
+              </a:solidFill>
+              <a:latin typeface="Calibri"/>
+              <a:ea typeface="Calibri"/>
+              <a:cs typeface="Calibri"/>
+              <a:sym typeface="Calibri"/>
+            </a:endParaRPr>
+          </a:p>
+          <a:p>
+            <a:pPr marL="914400" marR="0" lvl="1" indent="-381000" algn="l" rtl="0">
+              <a:spcBef>
+                <a:spcPts val="0"/>
+              </a:spcBef>
+              <a:spcAft>
+                <a:spcPts val="0"/>
+              </a:spcAft>
+              <a:buClr>
+                <a:schemeClr val="dk1"/>
+              </a:buClr>
+              <a:buSzPts val="2400"/>
+              <a:buFont typeface="Calibri"/>
+              <a:buChar char="○"/>
+            </a:pPr>
+            <a:r>
+              <a:rPr lang="en-US" sz="2400" dirty="0">
+                <a:solidFill>
+                  <a:schemeClr val="dk1"/>
+                </a:solidFill>
+                <a:latin typeface="Calibri"/>
+                <a:ea typeface="Calibri"/>
+                <a:cs typeface="Calibri"/>
+                <a:sym typeface="Calibri"/>
+              </a:rPr>
+              <a:t>Easily switch between views →</a:t>
+            </a:r>
+            <a:endParaRPr sz="2400" dirty="0">
+              <a:solidFill>
+                <a:schemeClr val="dk1"/>
+              </a:solidFill>
+              <a:latin typeface="Calibri"/>
+              <a:ea typeface="Calibri"/>
+              <a:cs typeface="Calibri"/>
+              <a:sym typeface="Calibri"/>
+            </a:endParaRPr>
+          </a:p>
+          <a:p>
+            <a:pPr marL="914400" marR="0" lvl="1" indent="-381000" algn="l" rtl="0">
+              <a:spcBef>
+                <a:spcPts val="0"/>
+              </a:spcBef>
+              <a:spcAft>
+                <a:spcPts val="0"/>
+              </a:spcAft>
+              <a:buClr>
+                <a:schemeClr val="dk1"/>
+              </a:buClr>
+              <a:buSzPts val="2400"/>
+              <a:buFont typeface="Calibri"/>
+              <a:buChar char="○"/>
+            </a:pPr>
+            <a:r>
+              <a:rPr lang="en-US" sz="2400" dirty="0">
+                <a:solidFill>
+                  <a:schemeClr val="dk1"/>
+                </a:solidFill>
+                <a:latin typeface="Calibri"/>
+                <a:ea typeface="Calibri"/>
+                <a:cs typeface="Calibri"/>
+                <a:sym typeface="Calibri"/>
+              </a:rPr>
+              <a:t>Pivot tables</a:t>
+            </a:r>
+            <a:endParaRPr sz="2400" dirty="0">
+              <a:solidFill>
+                <a:schemeClr val="dk1"/>
+              </a:solidFill>
+              <a:latin typeface="Calibri"/>
+              <a:ea typeface="Calibri"/>
+              <a:cs typeface="Calibri"/>
+              <a:sym typeface="Calibri"/>
+            </a:endParaRPr>
+          </a:p>
+          <a:p>
+            <a:pPr marL="914400" lvl="1" indent="-381000" algn="l" rtl="0">
+              <a:lnSpc>
+                <a:spcPct val="110000"/>
+              </a:lnSpc>
+              <a:spcBef>
+                <a:spcPts val="0"/>
+              </a:spcBef>
+              <a:spcAft>
+                <a:spcPts val="0"/>
+              </a:spcAft>
+              <a:buClr>
+                <a:schemeClr val="dk1"/>
+              </a:buClr>
+              <a:buSzPts val="2400"/>
+              <a:buFont typeface="Calibri"/>
+              <a:buChar char="○"/>
+            </a:pPr>
+            <a:r>
+              <a:rPr lang="en-US" sz="2400" dirty="0">
+                <a:solidFill>
+                  <a:schemeClr val="dk1"/>
+                </a:solidFill>
+                <a:latin typeface="Calibri"/>
+                <a:ea typeface="Calibri"/>
+                <a:cs typeface="Calibri"/>
+                <a:sym typeface="Calibri"/>
+              </a:rPr>
+              <a:t>Integrations with big data</a:t>
+            </a:r>
+            <a:endParaRPr sz="2400" dirty="0">
+              <a:solidFill>
+                <a:schemeClr val="dk1"/>
+              </a:solidFill>
+              <a:latin typeface="Calibri"/>
+              <a:ea typeface="Calibri"/>
+              <a:cs typeface="Calibri"/>
+              <a:sym typeface="Calibri"/>
+            </a:endParaRPr>
+          </a:p>
+          <a:p>
+            <a:pPr marL="457200" marR="0" lvl="0" indent="-381000" algn="l" rtl="0">
+              <a:spcBef>
+                <a:spcPts val="0"/>
+              </a:spcBef>
+              <a:spcAft>
+                <a:spcPts val="0"/>
+              </a:spcAft>
+              <a:buClr>
+                <a:schemeClr val="dk1"/>
+              </a:buClr>
+              <a:buSzPts val="2400"/>
+              <a:buFont typeface="Calibri"/>
+              <a:buChar char="●"/>
+            </a:pPr>
+            <a:r>
+              <a:rPr lang="en-US" sz="2400" dirty="0">
+                <a:solidFill>
+                  <a:schemeClr val="dk1"/>
+                </a:solidFill>
+                <a:latin typeface="Calibri"/>
+                <a:ea typeface="Calibri"/>
+                <a:cs typeface="Calibri"/>
+                <a:sym typeface="Calibri"/>
+              </a:rPr>
+              <a:t>Zeppelin offers the possibility to mix languages across cells</a:t>
+            </a:r>
+            <a:endParaRPr sz="2400" dirty="0">
+              <a:solidFill>
+                <a:schemeClr val="dk1"/>
+              </a:solidFill>
+              <a:latin typeface="Calibri"/>
+              <a:ea typeface="Calibri"/>
+              <a:cs typeface="Calibri"/>
+              <a:sym typeface="Calibri"/>
+            </a:endParaRPr>
+          </a:p>
+          <a:p>
+            <a:pPr marL="914400" marR="0" lvl="1" indent="-381000" algn="l" rtl="0">
+              <a:spcBef>
+                <a:spcPts val="0"/>
+              </a:spcBef>
+              <a:spcAft>
+                <a:spcPts val="0"/>
+              </a:spcAft>
+              <a:buClr>
+                <a:schemeClr val="dk1"/>
+              </a:buClr>
+              <a:buSzPts val="2400"/>
+              <a:buFont typeface="Calibri"/>
+              <a:buChar char="○"/>
+            </a:pPr>
+            <a:r>
+              <a:rPr lang="en-US" sz="2400" dirty="0">
+                <a:solidFill>
+                  <a:schemeClr val="dk1"/>
+                </a:solidFill>
+                <a:latin typeface="Calibri"/>
+                <a:ea typeface="Calibri"/>
+                <a:cs typeface="Calibri"/>
+                <a:sym typeface="Calibri"/>
+              </a:rPr>
+              <a:t>Database Interpreter</a:t>
+            </a:r>
+            <a:endParaRPr sz="2400" dirty="0">
+              <a:solidFill>
+                <a:schemeClr val="dk1"/>
+              </a:solidFill>
+              <a:latin typeface="Calibri"/>
+              <a:ea typeface="Calibri"/>
+              <a:cs typeface="Calibri"/>
+              <a:sym typeface="Calibri"/>
+            </a:endParaRPr>
           </a:p>
         </p:txBody>
       </p:sp>
       <p:pic>
         <p:nvPicPr>
-          <p:cNvPr id="10" name="Online Media 9" title="My First Apache Zeppelin Dashboard with SQL Server">
-            <a:hlinkClick r:id="" action="ppaction://media"/>
-            <a:extLst>
-              <a:ext uri="{FF2B5EF4-FFF2-40B4-BE49-F238E27FC236}">
-                <a16:creationId xmlns:a16="http://schemas.microsoft.com/office/drawing/2014/main" id="{0D605D30-F773-4F8C-AA5A-1145B579170F}"/>
-              </a:ext>
-            </a:extLst>
-          </p:cNvPr>
-          <p:cNvPicPr>
-            <a:picLocks noRot="1" noChangeAspect="1"/>
-          </p:cNvPicPr>
-          <p:nvPr>
-            <a:videoFile r:link="rId1"/>
-          </p:nvPr>
+          <p:cNvPr id="10" name="Google Shape;151;g7215718d5a_0_18">
+            <a:extLst>
+              <a:ext uri="{FF2B5EF4-FFF2-40B4-BE49-F238E27FC236}">
+                <a16:creationId xmlns:a16="http://schemas.microsoft.com/office/drawing/2014/main" id="{3A94F104-0BA9-4F0F-BE89-99FDF90A9E1C}"/>
+              </a:ext>
+            </a:extLst>
+          </p:cNvPr>
+          <p:cNvPicPr preferRelativeResize="0"/>
+          <p:nvPr/>
         </p:nvPicPr>
         <p:blipFill>
-          <a:blip r:embed="rId5"/>
+          <a:blip r:embed="rId3">
+            <a:alphaModFix/>
+          </a:blip>
           <a:stretch>
             <a:fillRect/>
           </a:stretch>
         </p:blipFill>
         <p:spPr>
           <a:xfrm>
-            <a:off x="445481" y="2852658"/>
-            <a:ext cx="5066788" cy="3503692"/>
+            <a:off x="6867775" y="2786948"/>
+            <a:ext cx="5130451" cy="1762553"/>
           </a:xfrm>
           <a:prstGeom prst="rect">
             <a:avLst/>
           </a:prstGeom>
-        </p:spPr>
-      </p:pic>
-      <p:pic>
-        <p:nvPicPr>
-          <p:cNvPr id="1028" name="Picture 4" descr="A map with data markers on it in Zeppelin">
-            <a:extLst>
-              <a:ext uri="{FF2B5EF4-FFF2-40B4-BE49-F238E27FC236}">
-                <a16:creationId xmlns:a16="http://schemas.microsoft.com/office/drawing/2014/main" id="{F53D624D-05FE-40C1-B6FE-C45DFD2619C0}"/>
-              </a:ext>
-            </a:extLst>
-          </p:cNvPr>
-          <p:cNvPicPr>
-            <a:picLocks noChangeAspect="1" noChangeArrowheads="1"/>
-          </p:cNvPicPr>
-          <p:nvPr/>
-        </p:nvPicPr>
-        <p:blipFill>
-          <a:blip r:embed="rId6">
-            <a:extLst>
-              <a:ext uri="{28A0092B-C50C-407E-A947-70E740481C1C}">
-                <a14:useLocalDpi xmlns:a14="http://schemas.microsoft.com/office/drawing/2010/main" val="0"/>
-              </a:ext>
-            </a:extLst>
-          </a:blip>
-          <a:srcRect/>
-          <a:stretch>
-            <a:fillRect/>
-          </a:stretch>
-        </p:blipFill>
-        <p:spPr bwMode="auto">
-          <a:xfrm>
-            <a:off x="6477045" y="3436775"/>
-            <a:ext cx="4267110" cy="2506409"/>
-          </a:xfrm>
-          <a:prstGeom prst="roundRect">
-            <a:avLst>
-              <a:gd name="adj" fmla="val 8594"/>
-            </a:avLst>
-          </a:prstGeom>
-          <a:solidFill>
-            <a:srgbClr val="FFFFFF">
-              <a:shade val="85000"/>
-            </a:srgbClr>
-          </a:solidFill>
+          <a:noFill/>
           <a:ln>
             <a:noFill/>
           </a:ln>
-          <a:effectLst>
-            <a:reflection blurRad="12700" stA="38000" endPos="28000" dist="5000" dir="5400000" sy="-100000" algn="bl" rotWithShape="0"/>
-          </a:effectLst>
         </p:spPr>
       </p:pic>
-      <p:sp>
-        <p:nvSpPr>
-          <p:cNvPr id="3" name="Rectangle 2">
-            <a:extLst>
-              <a:ext uri="{FF2B5EF4-FFF2-40B4-BE49-F238E27FC236}">
-                <a16:creationId xmlns:a16="http://schemas.microsoft.com/office/drawing/2014/main" id="{7F7F8BD8-3BD1-40CD-8CB9-F0F1564F6C79}"/>
-              </a:ext>
-            </a:extLst>
-          </p:cNvPr>
-          <p:cNvSpPr/>
-          <p:nvPr/>
-        </p:nvSpPr>
-        <p:spPr>
-          <a:xfrm>
-            <a:off x="0" y="6590670"/>
-            <a:ext cx="2619628" cy="261610"/>
-          </a:xfrm>
-          <a:prstGeom prst="rect">
-            <a:avLst/>
-          </a:prstGeom>
-        </p:spPr>
-        <p:txBody>
-          <a:bodyPr wrap="none">
-            <a:spAutoFit/>
-          </a:bodyPr>
-          <a:lstStyle/>
-          <a:p>
-            <a:r>
-              <a:rPr lang="en-US" altLang="zh-CN" sz="1100" dirty="0">
-                <a:hlinkClick r:id="rId7"/>
-              </a:rPr>
-              <a:t>Reference: </a:t>
-            </a:r>
-            <a:r>
-              <a:rPr lang="en-US" sz="1100" dirty="0">
-                <a:hlinkClick r:id="rId7"/>
-              </a:rPr>
-              <a:t>https://vimeo.com/198582184</a:t>
-            </a:r>
-            <a:endParaRPr lang="en-US" sz="1100" dirty="0"/>
-          </a:p>
-        </p:txBody>
-      </p:sp>
     </p:spTree>
     <p:extLst>
       <p:ext uri="{BB962C8B-B14F-4D97-AF65-F5344CB8AC3E}">
-        <p14:creationId xmlns:p14="http://schemas.microsoft.com/office/powerpoint/2010/main" val="1560823057"/>
+        <p14:creationId xmlns:p14="http://schemas.microsoft.com/office/powerpoint/2010/main" val="2475696536"/>
       </p:ext>
     </p:extLst>
   </p:cSld>
   <p:clrMapOvr>
     <a:masterClrMapping/>
   </p:clrMapOvr>
-  <p:timing>
-    <p:tnLst>
-      <p:par>
-        <p:cTn id="1" dur="indefinite" restart="never" nodeType="tmRoot">
-          <p:childTnLst>
-            <p:seq concurrent="1" nextAc="seek">
-              <p:cTn id="2" dur="indefinite" nodeType="mainSeq">
-                <p:childTnLst>
-                  <p:par>
-                    <p:cTn id="3" fill="hold">
-                      <p:stCondLst>
-                        <p:cond delay="indefinite"/>
-                      </p:stCondLst>
-                      <p:childTnLst>
-                        <p:par>
-                          <p:cTn id="4" fill="hold">
-                            <p:stCondLst>
-                              <p:cond delay="0"/>
-                            </p:stCondLst>
-                            <p:childTnLst>
-                              <p:par>
-                                <p:cTn id="5" presetID="1" presetClass="mediacall" presetSubtype="0" fill="hold" nodeType="clickEffect">
-                                  <p:stCondLst>
-                                    <p:cond delay="0"/>
-                                  </p:stCondLst>
-                                  <p:childTnLst>
-                                    <p:cmd type="call" cmd="playFrom(0.0)">
-                                      <p:cBhvr>
-                                        <p:cTn id="6" dur="1" fill="hold"/>
-                                        <p:tgtEl>
-                                          <p:spTgt spid="10"/>
-                                        </p:tgtEl>
-                                      </p:cBhvr>
-                                    </p:cmd>
-                                  </p:childTnLst>
-                                </p:cTn>
-                              </p:par>
-                            </p:childTnLst>
-                          </p:cTn>
-                        </p:par>
-                      </p:childTnLst>
-                    </p:cTn>
-                  </p:par>
-                </p:childTnLst>
-              </p:cTn>
-              <p:prevCondLst>
-                <p:cond evt="onPrev" delay="0">
-                  <p:tgtEl>
-                    <p:sldTgt/>
-                  </p:tgtEl>
-                </p:cond>
-              </p:prevCondLst>
-              <p:nextCondLst>
-                <p:cond evt="onNext" delay="0">
-                  <p:tgtEl>
-                    <p:sldTgt/>
-                  </p:tgtEl>
-                </p:cond>
-              </p:nextCondLst>
-            </p:seq>
-            <p:video>
-              <p:cMediaNode vol="80000">
-                <p:cTn id="7" fill="hold" display="0">
-                  <p:stCondLst>
-                    <p:cond delay="indefinite"/>
-                  </p:stCondLst>
-                </p:cTn>
-                <p:tgtEl>
-                  <p:spTgt spid="10"/>
-                </p:tgtEl>
-              </p:cMediaNode>
-            </p:video>
-            <p:seq concurrent="1" nextAc="seek">
-              <p:cTn id="8" restart="whenNotActive" fill="hold" evtFilter="cancelBubble" nodeType="interactiveSeq">
-                <p:stCondLst>
-                  <p:cond evt="onClick" delay="0">
-                    <p:tgtEl>
-                      <p:spTgt spid="10"/>
-                    </p:tgtEl>
-                  </p:cond>
-                </p:stCondLst>
-                <p:endSync evt="end" delay="0">
-                  <p:rtn val="all"/>
-                </p:endSync>
-                <p:childTnLst>
-                  <p:par>
-                    <p:cTn id="9" fill="hold">
-                      <p:stCondLst>
-                        <p:cond delay="0"/>
-                      </p:stCondLst>
-                      <p:childTnLst>
-                        <p:par>
-                          <p:cTn id="10" fill="hold">
-                            <p:stCondLst>
-                              <p:cond delay="0"/>
-                            </p:stCondLst>
-                            <p:childTnLst>
-                              <p:par>
-                                <p:cTn id="11" presetID="2" presetClass="mediacall" presetSubtype="0" fill="hold" nodeType="clickEffect">
-                                  <p:stCondLst>
-                                    <p:cond delay="0"/>
-                                  </p:stCondLst>
-                                  <p:childTnLst>
-                                    <p:cmd type="call" cmd="togglePause">
-                                      <p:cBhvr>
-                                        <p:cTn id="12" dur="1" fill="hold"/>
-                                        <p:tgtEl>
-                                          <p:spTgt spid="10"/>
-                                        </p:tgtEl>
-                                      </p:cBhvr>
-                                    </p:cmd>
-                                  </p:childTnLst>
-                                </p:cTn>
-                              </p:par>
-                            </p:childTnLst>
-                          </p:cTn>
-                        </p:par>
-                      </p:childTnLst>
-                    </p:cTn>
-                  </p:par>
-                </p:childTnLst>
-              </p:cTn>
-              <p:nextCondLst>
-                <p:cond evt="onClick" delay="0">
-                  <p:tgtEl>
-                    <p:spTgt spid="10"/>
-                  </p:tgtEl>
-                </p:cond>
-              </p:nextCondLst>
-            </p:seq>
-          </p:childTnLst>
-        </p:cTn>
-      </p:par>
-    </p:tnLst>
-  </p:timing>
 </p:sld>
 </file>
 
@@ -6658,15 +6791,7 @@
           <a:p>
             <a:r>
               <a:rPr lang="en-US" b="1" dirty="0"/>
-              <a:t>Zeppelin Over </a:t>
-            </a:r>
-            <a:r>
-              <a:rPr lang="en-US" b="1" dirty="0" err="1"/>
-              <a:t>Jupyter</a:t>
-            </a:r>
-            <a:r>
-              <a:rPr lang="en-US" b="1" dirty="0"/>
-              <a:t> </a:t>
+              <a:t>Would we use it?</a:t>
             </a:r>
             <a:endParaRPr lang="en-US" dirty="0"/>
           </a:p>
@@ -6774,8 +6899,8 @@
         </p:nvSpPr>
         <p:spPr>
           <a:xfrm>
-            <a:off x="838200" y="1825625"/>
-            <a:ext cx="10515600" cy="4351338"/>
+            <a:off x="381000" y="1953441"/>
+            <a:ext cx="6353175" cy="4351338"/>
           </a:xfrm>
           <a:prstGeom prst="rect">
             <a:avLst/>
@@ -6791,13 +6916,10 @@
           </a:bodyPr>
           <a:lstStyle/>
           <a:p>
-            <a:pPr marL="457200" marR="0" lvl="0" indent="-381000" algn="l" rtl="0">
+            <a:pPr marL="457200" lvl="0" indent="-381000">
               <a:spcBef>
                 <a:spcPts val="0"/>
               </a:spcBef>
-              <a:spcAft>
-                <a:spcPts val="0"/>
-              </a:spcAft>
               <a:buClr>
                 <a:schemeClr val="dk1"/>
               </a:buClr>
@@ -6810,31 +6932,42 @@
                 <a:solidFill>
                   <a:schemeClr val="dk1"/>
                 </a:solidFill>
-                <a:latin typeface="Calibri"/>
                 <a:ea typeface="Calibri"/>
                 <a:cs typeface="Calibri"/>
                 <a:sym typeface="Calibri"/>
               </a:rPr>
-              <a:t>Secure Collaborations</a:t>
-            </a:r>
-            <a:endParaRPr sz="2400" dirty="0">
-              <a:solidFill>
-                <a:schemeClr val="dk1"/>
-              </a:solidFill>
-              <a:latin typeface="Calibri"/>
-              <a:ea typeface="Calibri"/>
-              <a:cs typeface="Calibri"/>
-              <a:sym typeface="Calibri"/>
-            </a:endParaRPr>
-          </a:p>
-          <a:p>
-            <a:pPr marL="914400" marR="0" lvl="1" indent="-381000" algn="l" rtl="0">
+              <a:t>YES!</a:t>
+            </a:r>
+          </a:p>
+          <a:p>
+            <a:pPr marL="457200" lvl="0" indent="-381000">
               <a:spcBef>
                 <a:spcPts val="0"/>
               </a:spcBef>
-              <a:spcAft>
+              <a:buClr>
+                <a:schemeClr val="dk1"/>
+              </a:buClr>
+              <a:buSzPts val="2400"/>
+              <a:buFont typeface="Calibri"/>
+              <a:buChar char="●"/>
+            </a:pPr>
+            <a:r>
+              <a:rPr lang="en-US" sz="2400" dirty="0">
+                <a:solidFill>
+                  <a:schemeClr val="dk1"/>
+                </a:solidFill>
+                <a:ea typeface="Calibri"/>
+                <a:cs typeface="Calibri"/>
+                <a:sym typeface="Calibri"/>
+              </a:rPr>
+              <a:t>Pros:</a:t>
+            </a:r>
+          </a:p>
+          <a:p>
+            <a:pPr marL="914400" lvl="1" indent="-381000">
+              <a:spcBef>
                 <a:spcPts val="0"/>
-              </a:spcAft>
+              </a:spcBef>
               <a:buClr>
                 <a:schemeClr val="dk1"/>
               </a:buClr>
@@ -6843,35 +6976,22 @@
               <a:buChar char="○"/>
             </a:pPr>
             <a:r>
-              <a:rPr lang="en-US" sz="2400" dirty="0">
+              <a:rPr lang="en-US" dirty="0">
                 <a:solidFill>
                   <a:schemeClr val="dk1"/>
                 </a:solidFill>
-                <a:latin typeface="Calibri"/>
                 <a:ea typeface="Calibri"/>
                 <a:cs typeface="Calibri"/>
                 <a:sym typeface="Calibri"/>
               </a:rPr>
-              <a:t>Security measures</a:t>
-            </a:r>
-            <a:endParaRPr sz="2400" dirty="0">
-              <a:solidFill>
-                <a:schemeClr val="dk1"/>
-              </a:solidFill>
-              <a:latin typeface="Calibri"/>
-              <a:ea typeface="Calibri"/>
-              <a:cs typeface="Calibri"/>
-              <a:sym typeface="Calibri"/>
-            </a:endParaRPr>
-          </a:p>
-          <a:p>
-            <a:pPr marL="914400" marR="0" lvl="1" indent="-381000" algn="l" rtl="0">
+              <a:t>Data Analysis and Graphing </a:t>
+            </a:r>
+          </a:p>
+          <a:p>
+            <a:pPr marL="914400" lvl="1" indent="-381000">
               <a:spcBef>
                 <a:spcPts val="0"/>
               </a:spcBef>
-              <a:spcAft>
-                <a:spcPts val="0"/>
-              </a:spcAft>
               <a:buClr>
                 <a:schemeClr val="dk1"/>
               </a:buClr>
@@ -6880,35 +7000,22 @@
               <a:buChar char="○"/>
             </a:pPr>
             <a:r>
-              <a:rPr lang="en-US" sz="2400" dirty="0">
+              <a:rPr lang="en-US" dirty="0">
                 <a:solidFill>
                   <a:schemeClr val="dk1"/>
                 </a:solidFill>
-                <a:latin typeface="Calibri"/>
                 <a:ea typeface="Calibri"/>
                 <a:cs typeface="Calibri"/>
                 <a:sym typeface="Calibri"/>
               </a:rPr>
-              <a:t>Real time changes</a:t>
-            </a:r>
-            <a:endParaRPr sz="2400" dirty="0">
-              <a:solidFill>
-                <a:schemeClr val="dk1"/>
-              </a:solidFill>
-              <a:latin typeface="Calibri"/>
-              <a:ea typeface="Calibri"/>
-              <a:cs typeface="Calibri"/>
-              <a:sym typeface="Calibri"/>
-            </a:endParaRPr>
-          </a:p>
-          <a:p>
-            <a:pPr marL="914400" marR="0" lvl="1" indent="-381000" algn="l" rtl="0">
+              <a:t>Collaboration and Real Time Updates</a:t>
+            </a:r>
+          </a:p>
+          <a:p>
+            <a:pPr marL="914400" lvl="1" indent="-381000">
               <a:spcBef>
                 <a:spcPts val="0"/>
               </a:spcBef>
-              <a:spcAft>
-                <a:spcPts val="0"/>
-              </a:spcAft>
               <a:buClr>
                 <a:schemeClr val="dk1"/>
               </a:buClr>
@@ -6917,35 +7024,46 @@
               <a:buChar char="○"/>
             </a:pPr>
             <a:r>
-              <a:rPr lang="en-US" sz="2400" dirty="0">
+              <a:rPr lang="en-US" dirty="0">
                 <a:solidFill>
                   <a:schemeClr val="dk1"/>
                 </a:solidFill>
-                <a:latin typeface="Calibri"/>
                 <a:ea typeface="Calibri"/>
                 <a:cs typeface="Calibri"/>
                 <a:sym typeface="Calibri"/>
               </a:rPr>
-              <a:t>Sharing  - read only, read and edit</a:t>
-            </a:r>
-            <a:endParaRPr sz="2400" dirty="0">
-              <a:solidFill>
-                <a:schemeClr val="dk1"/>
-              </a:solidFill>
-              <a:latin typeface="Calibri"/>
-              <a:ea typeface="Calibri"/>
-              <a:cs typeface="Calibri"/>
-              <a:sym typeface="Calibri"/>
-            </a:endParaRPr>
-          </a:p>
-          <a:p>
-            <a:pPr marL="914400" marR="0" lvl="1" indent="-381000" algn="l" rtl="0">
+              <a:t>Multilingual across cells</a:t>
+            </a:r>
+          </a:p>
+          <a:p>
+            <a:pPr marL="457200" lvl="0" indent="-381000">
               <a:spcBef>
                 <a:spcPts val="0"/>
               </a:spcBef>
-              <a:spcAft>
+              <a:buClr>
+                <a:schemeClr val="dk1"/>
+              </a:buClr>
+              <a:buSzPts val="2400"/>
+              <a:buFont typeface="Calibri"/>
+              <a:buChar char="●"/>
+            </a:pPr>
+            <a:r>
+              <a:rPr lang="en-US" sz="2400" dirty="0">
+                <a:solidFill>
+                  <a:schemeClr val="dk1"/>
+                </a:solidFill>
+                <a:ea typeface="Calibri"/>
+                <a:cs typeface="Calibri"/>
+                <a:sym typeface="Calibri"/>
+              </a:rPr>
+              <a:t>Cons:</a:t>
+            </a:r>
+          </a:p>
+          <a:p>
+            <a:pPr marL="914400" lvl="1" indent="-381000">
+              <a:spcBef>
                 <a:spcPts val="0"/>
-              </a:spcAft>
+              </a:spcBef>
               <a:buClr>
                 <a:schemeClr val="dk1"/>
               </a:buClr>
@@ -6954,72 +7072,22 @@
               <a:buChar char="○"/>
             </a:pPr>
             <a:r>
-              <a:rPr lang="en-US" sz="2400" dirty="0">
+              <a:rPr lang="en-US" dirty="0">
                 <a:solidFill>
                   <a:schemeClr val="dk1"/>
                 </a:solidFill>
-                <a:latin typeface="Calibri"/>
                 <a:ea typeface="Calibri"/>
                 <a:cs typeface="Calibri"/>
                 <a:sym typeface="Calibri"/>
               </a:rPr>
-              <a:t>Embedding link</a:t>
-            </a:r>
-            <a:endParaRPr sz="2400" dirty="0">
-              <a:solidFill>
-                <a:schemeClr val="dk1"/>
-              </a:solidFill>
-              <a:latin typeface="Calibri"/>
-              <a:ea typeface="Calibri"/>
-              <a:cs typeface="Calibri"/>
-              <a:sym typeface="Calibri"/>
-            </a:endParaRPr>
-          </a:p>
-          <a:p>
-            <a:pPr marL="457200" marR="0" lvl="0" indent="-381000" algn="l" rtl="0">
+              <a:t>Java based </a:t>
+            </a:r>
+          </a:p>
+          <a:p>
+            <a:pPr marL="914400" lvl="1" indent="-381000">
               <a:spcBef>
                 <a:spcPts val="0"/>
               </a:spcBef>
-              <a:spcAft>
-                <a:spcPts val="0"/>
-              </a:spcAft>
-              <a:buClr>
-                <a:schemeClr val="dk1"/>
-              </a:buClr>
-              <a:buSzPts val="2400"/>
-              <a:buFont typeface="Calibri"/>
-              <a:buChar char="●"/>
-            </a:pPr>
-            <a:r>
-              <a:rPr lang="en-US" sz="2400" dirty="0">
-                <a:solidFill>
-                  <a:schemeClr val="dk1"/>
-                </a:solidFill>
-                <a:latin typeface="Calibri"/>
-                <a:ea typeface="Calibri"/>
-                <a:cs typeface="Calibri"/>
-                <a:sym typeface="Calibri"/>
-              </a:rPr>
-              <a:t>Extensive Graphing Capabilities </a:t>
-            </a:r>
-            <a:endParaRPr sz="2400" dirty="0">
-              <a:solidFill>
-                <a:schemeClr val="dk1"/>
-              </a:solidFill>
-              <a:latin typeface="Calibri"/>
-              <a:ea typeface="Calibri"/>
-              <a:cs typeface="Calibri"/>
-              <a:sym typeface="Calibri"/>
-            </a:endParaRPr>
-          </a:p>
-          <a:p>
-            <a:pPr marL="914400" marR="0" lvl="1" indent="-381000" algn="l" rtl="0">
-              <a:spcBef>
-                <a:spcPts val="0"/>
-              </a:spcBef>
-              <a:spcAft>
-                <a:spcPts val="0"/>
-              </a:spcAft>
               <a:buClr>
                 <a:schemeClr val="dk1"/>
               </a:buClr>
@@ -7028,218 +7096,125 @@
               <a:buChar char="○"/>
             </a:pPr>
             <a:r>
-              <a:rPr lang="en-US" sz="2400" dirty="0">
+              <a:rPr lang="en-US" dirty="0">
                 <a:solidFill>
                   <a:schemeClr val="dk1"/>
                 </a:solidFill>
-                <a:latin typeface="Calibri"/>
                 <a:ea typeface="Calibri"/>
                 <a:cs typeface="Calibri"/>
                 <a:sym typeface="Calibri"/>
               </a:rPr>
-              <a:t>Easily switch between views →</a:t>
-            </a:r>
-            <a:endParaRPr sz="2400" dirty="0">
-              <a:solidFill>
-                <a:schemeClr val="dk1"/>
-              </a:solidFill>
-              <a:latin typeface="Calibri"/>
-              <a:ea typeface="Calibri"/>
-              <a:cs typeface="Calibri"/>
-              <a:sym typeface="Calibri"/>
-            </a:endParaRPr>
-          </a:p>
-          <a:p>
-            <a:pPr marL="914400" marR="0" lvl="1" indent="-381000" algn="l" rtl="0">
-              <a:spcBef>
-                <a:spcPts val="0"/>
-              </a:spcBef>
-              <a:spcAft>
-                <a:spcPts val="0"/>
-              </a:spcAft>
-              <a:buClr>
-                <a:schemeClr val="dk1"/>
-              </a:buClr>
-              <a:buSzPts val="2400"/>
-              <a:buFont typeface="Calibri"/>
-              <a:buChar char="○"/>
-            </a:pPr>
-            <a:r>
-              <a:rPr lang="en-US" sz="2400" dirty="0">
-                <a:solidFill>
-                  <a:schemeClr val="dk1"/>
-                </a:solidFill>
-                <a:latin typeface="Calibri"/>
-                <a:ea typeface="Calibri"/>
-                <a:cs typeface="Calibri"/>
-                <a:sym typeface="Calibri"/>
-              </a:rPr>
-              <a:t>Pivot tables</a:t>
-            </a:r>
-            <a:endParaRPr sz="2400" dirty="0">
-              <a:solidFill>
-                <a:schemeClr val="dk1"/>
-              </a:solidFill>
-              <a:latin typeface="Calibri"/>
-              <a:ea typeface="Calibri"/>
-              <a:cs typeface="Calibri"/>
-              <a:sym typeface="Calibri"/>
-            </a:endParaRPr>
-          </a:p>
-          <a:p>
-            <a:pPr marL="914400" lvl="1" indent="-381000" algn="l" rtl="0">
-              <a:lnSpc>
-                <a:spcPct val="110000"/>
-              </a:lnSpc>
-              <a:spcBef>
-                <a:spcPts val="0"/>
-              </a:spcBef>
-              <a:spcAft>
-                <a:spcPts val="0"/>
-              </a:spcAft>
-              <a:buClr>
-                <a:schemeClr val="dk1"/>
-              </a:buClr>
-              <a:buSzPts val="2400"/>
-              <a:buFont typeface="Calibri"/>
-              <a:buChar char="○"/>
-            </a:pPr>
-            <a:r>
-              <a:rPr lang="en-US" sz="2400" dirty="0">
-                <a:solidFill>
-                  <a:schemeClr val="dk1"/>
-                </a:solidFill>
-                <a:latin typeface="Calibri"/>
-                <a:ea typeface="Calibri"/>
-                <a:cs typeface="Calibri"/>
-                <a:sym typeface="Calibri"/>
-              </a:rPr>
-              <a:t>Integrations with big data</a:t>
-            </a:r>
-            <a:endParaRPr sz="2400" dirty="0">
-              <a:solidFill>
-                <a:schemeClr val="dk1"/>
-              </a:solidFill>
-              <a:latin typeface="Calibri"/>
-              <a:ea typeface="Calibri"/>
-              <a:cs typeface="Calibri"/>
-              <a:sym typeface="Calibri"/>
-            </a:endParaRPr>
-          </a:p>
-          <a:p>
-            <a:pPr marL="457200" marR="0" lvl="0" indent="-381000" algn="l" rtl="0">
-              <a:spcBef>
-                <a:spcPts val="0"/>
-              </a:spcBef>
-              <a:spcAft>
-                <a:spcPts val="0"/>
-              </a:spcAft>
-              <a:buClr>
-                <a:schemeClr val="dk1"/>
-              </a:buClr>
-              <a:buSzPts val="2400"/>
-              <a:buFont typeface="Calibri"/>
-              <a:buChar char="●"/>
-            </a:pPr>
-            <a:r>
-              <a:rPr lang="en-US" sz="2400" dirty="0">
-                <a:solidFill>
-                  <a:schemeClr val="dk1"/>
-                </a:solidFill>
-                <a:latin typeface="Calibri"/>
-                <a:ea typeface="Calibri"/>
-                <a:cs typeface="Calibri"/>
-                <a:sym typeface="Calibri"/>
-              </a:rPr>
-              <a:t>Zeppelin offers the possibility to mix languages across cells</a:t>
-            </a:r>
-            <a:endParaRPr sz="2400" dirty="0">
-              <a:solidFill>
-                <a:schemeClr val="dk1"/>
-              </a:solidFill>
-              <a:latin typeface="Calibri"/>
-              <a:ea typeface="Calibri"/>
-              <a:cs typeface="Calibri"/>
-              <a:sym typeface="Calibri"/>
-            </a:endParaRPr>
-          </a:p>
-          <a:p>
-            <a:pPr marL="914400" marR="0" lvl="1" indent="-381000" algn="l" rtl="0">
-              <a:spcBef>
-                <a:spcPts val="0"/>
-              </a:spcBef>
-              <a:spcAft>
-                <a:spcPts val="0"/>
-              </a:spcAft>
-              <a:buClr>
-                <a:schemeClr val="dk1"/>
-              </a:buClr>
-              <a:buSzPts val="2400"/>
-              <a:buFont typeface="Calibri"/>
-              <a:buChar char="○"/>
-            </a:pPr>
-            <a:r>
-              <a:rPr lang="en-US" sz="2400" dirty="0">
-                <a:solidFill>
-                  <a:schemeClr val="dk1"/>
-                </a:solidFill>
-                <a:latin typeface="Calibri"/>
-                <a:ea typeface="Calibri"/>
-                <a:cs typeface="Calibri"/>
-                <a:sym typeface="Calibri"/>
-              </a:rPr>
-              <a:t>Database Interpreter</a:t>
-            </a:r>
-            <a:endParaRPr sz="2400" dirty="0">
-              <a:solidFill>
-                <a:schemeClr val="dk1"/>
-              </a:solidFill>
-              <a:latin typeface="Calibri"/>
-              <a:ea typeface="Calibri"/>
-              <a:cs typeface="Calibri"/>
-              <a:sym typeface="Calibri"/>
-            </a:endParaRPr>
+              <a:t>Installation</a:t>
+            </a:r>
           </a:p>
         </p:txBody>
       </p:sp>
       <p:pic>
         <p:nvPicPr>
-          <p:cNvPr id="10" name="Google Shape;151;g7215718d5a_0_18">
-            <a:extLst>
-              <a:ext uri="{FF2B5EF4-FFF2-40B4-BE49-F238E27FC236}">
-                <a16:creationId xmlns:a16="http://schemas.microsoft.com/office/drawing/2014/main" id="{3A94F104-0BA9-4F0F-BE89-99FDF90A9E1C}"/>
-              </a:ext>
-            </a:extLst>
-          </p:cNvPr>
-          <p:cNvPicPr preferRelativeResize="0"/>
+          <p:cNvPr id="8" name="Picture 2">
+            <a:extLst>
+              <a:ext uri="{FF2B5EF4-FFF2-40B4-BE49-F238E27FC236}">
+                <a16:creationId xmlns:a16="http://schemas.microsoft.com/office/drawing/2014/main" id="{2221A78A-68E8-45B6-8C2F-14D2EC4E23D4}"/>
+              </a:ext>
+            </a:extLst>
+          </p:cNvPr>
+          <p:cNvPicPr>
+            <a:picLocks noChangeAspect="1" noChangeArrowheads="1"/>
+          </p:cNvPicPr>
           <p:nvPr/>
         </p:nvPicPr>
         <p:blipFill>
           <a:blip r:embed="rId3">
-            <a:alphaModFix/>
+            <a:extLst>
+              <a:ext uri="{28A0092B-C50C-407E-A947-70E740481C1C}">
+                <a14:useLocalDpi xmlns:a14="http://schemas.microsoft.com/office/drawing/2010/main" val="0"/>
+              </a:ext>
+            </a:extLst>
           </a:blip>
+          <a:srcRect/>
           <a:stretch>
             <a:fillRect/>
           </a:stretch>
         </p:blipFill>
-        <p:spPr>
+        <p:spPr bwMode="auto">
           <a:xfrm>
-            <a:off x="6867775" y="2786948"/>
-            <a:ext cx="5130451" cy="1762553"/>
+            <a:off x="6545952" y="3548596"/>
+            <a:ext cx="4937651" cy="2807754"/>
           </a:xfrm>
           <a:prstGeom prst="rect">
             <a:avLst/>
           </a:prstGeom>
-          <a:noFill/>
           <a:ln>
             <a:noFill/>
           </a:ln>
+          <a:effectLst>
+            <a:softEdge rad="112500"/>
+          </a:effectLst>
+          <a:extLst>
+            <a:ext uri="{909E8E84-426E-40DD-AFC4-6F175D3DCCD1}">
+              <a14:hiddenFill xmlns:a14="http://schemas.microsoft.com/office/drawing/2010/main">
+                <a:solidFill>
+                  <a:srgbClr val="FFFFFF"/>
+                </a:solidFill>
+              </a14:hiddenFill>
+            </a:ext>
+          </a:extLst>
+        </p:spPr>
+      </p:pic>
+      <p:pic>
+        <p:nvPicPr>
+          <p:cNvPr id="11" name="Picture 4" descr="A map with data markers on it in Zeppelin">
+            <a:extLst>
+              <a:ext uri="{FF2B5EF4-FFF2-40B4-BE49-F238E27FC236}">
+                <a16:creationId xmlns:a16="http://schemas.microsoft.com/office/drawing/2014/main" id="{5DC89D67-D387-437D-8D43-775B7613A1BD}"/>
+              </a:ext>
+            </a:extLst>
+          </p:cNvPr>
+          <p:cNvPicPr>
+            <a:picLocks noChangeAspect="1" noChangeArrowheads="1"/>
+          </p:cNvPicPr>
+          <p:nvPr/>
+        </p:nvPicPr>
+        <p:blipFill>
+          <a:blip r:embed="rId4">
+            <a:extLst>
+              <a:ext uri="{28A0092B-C50C-407E-A947-70E740481C1C}">
+                <a14:useLocalDpi xmlns:a14="http://schemas.microsoft.com/office/drawing/2010/main" val="0"/>
+              </a:ext>
+            </a:extLst>
+          </a:blip>
+          <a:srcRect/>
+          <a:stretch>
+            <a:fillRect/>
+          </a:stretch>
+        </p:blipFill>
+        <p:spPr bwMode="auto">
+          <a:xfrm>
+            <a:off x="5715090" y="102372"/>
+            <a:ext cx="4267110" cy="2506409"/>
+          </a:xfrm>
+          <a:prstGeom prst="roundRect">
+            <a:avLst>
+              <a:gd name="adj" fmla="val 8594"/>
+            </a:avLst>
+          </a:prstGeom>
+          <a:solidFill>
+            <a:srgbClr val="FFFFFF">
+              <a:shade val="85000"/>
+            </a:srgbClr>
+          </a:solidFill>
+          <a:ln>
+            <a:noFill/>
+          </a:ln>
+          <a:effectLst>
+            <a:reflection blurRad="12700" stA="38000" endPos="28000" dist="5000" dir="5400000" sy="-100000" algn="bl" rotWithShape="0"/>
+          </a:effectLst>
         </p:spPr>
       </p:pic>
     </p:spTree>
     <p:extLst>
       <p:ext uri="{BB962C8B-B14F-4D97-AF65-F5344CB8AC3E}">
-        <p14:creationId xmlns:p14="http://schemas.microsoft.com/office/powerpoint/2010/main" val="2475696536"/>
+        <p14:creationId xmlns:p14="http://schemas.microsoft.com/office/powerpoint/2010/main" val="2596624085"/>
       </p:ext>
     </p:extLst>
   </p:cSld>

</xml_diff>